<commit_message>
finish predicting the labels by phonemes
</commit_message>
<xml_diff>
--- a/20200522/Model_Structure.pptx
+++ b/20200522/Model_Structure.pptx
@@ -105,6 +105,11 @@
       </a:defRPr>
     </a:lvl9pPr>
   </p:defaultTextStyle>
+  <p:extLst>
+    <p:ext uri="{EFAFB233-063F-42B5-8137-9DF3F51BA10A}">
+      <p15:sldGuideLst xmlns:p15="http://schemas.microsoft.com/office/powerpoint/2012/main"/>
+    </p:ext>
+  </p:extLst>
 </p:presentation>
 </file>
 
@@ -255,7 +260,7 @@
           <a:p>
             <a:fld id="{30CB73BA-72EF-43C6-B8BE-F9E08D623C95}" type="datetimeFigureOut">
               <a:rPr lang="zh-TW" altLang="en-US" smtClean="0"/>
-              <a:t>2020/5/16</a:t>
+              <a:t>2020/5/19</a:t>
             </a:fld>
             <a:endParaRPr lang="zh-TW" altLang="en-US"/>
           </a:p>
@@ -453,7 +458,7 @@
           <a:p>
             <a:fld id="{30CB73BA-72EF-43C6-B8BE-F9E08D623C95}" type="datetimeFigureOut">
               <a:rPr lang="zh-TW" altLang="en-US" smtClean="0"/>
-              <a:t>2020/5/16</a:t>
+              <a:t>2020/5/19</a:t>
             </a:fld>
             <a:endParaRPr lang="zh-TW" altLang="en-US"/>
           </a:p>
@@ -661,7 +666,7 @@
           <a:p>
             <a:fld id="{30CB73BA-72EF-43C6-B8BE-F9E08D623C95}" type="datetimeFigureOut">
               <a:rPr lang="zh-TW" altLang="en-US" smtClean="0"/>
-              <a:t>2020/5/16</a:t>
+              <a:t>2020/5/19</a:t>
             </a:fld>
             <a:endParaRPr lang="zh-TW" altLang="en-US"/>
           </a:p>
@@ -859,7 +864,7 @@
           <a:p>
             <a:fld id="{30CB73BA-72EF-43C6-B8BE-F9E08D623C95}" type="datetimeFigureOut">
               <a:rPr lang="zh-TW" altLang="en-US" smtClean="0"/>
-              <a:t>2020/5/16</a:t>
+              <a:t>2020/5/19</a:t>
             </a:fld>
             <a:endParaRPr lang="zh-TW" altLang="en-US"/>
           </a:p>
@@ -1134,7 +1139,7 @@
           <a:p>
             <a:fld id="{30CB73BA-72EF-43C6-B8BE-F9E08D623C95}" type="datetimeFigureOut">
               <a:rPr lang="zh-TW" altLang="en-US" smtClean="0"/>
-              <a:t>2020/5/16</a:t>
+              <a:t>2020/5/19</a:t>
             </a:fld>
             <a:endParaRPr lang="zh-TW" altLang="en-US"/>
           </a:p>
@@ -1399,7 +1404,7 @@
           <a:p>
             <a:fld id="{30CB73BA-72EF-43C6-B8BE-F9E08D623C95}" type="datetimeFigureOut">
               <a:rPr lang="zh-TW" altLang="en-US" smtClean="0"/>
-              <a:t>2020/5/16</a:t>
+              <a:t>2020/5/19</a:t>
             </a:fld>
             <a:endParaRPr lang="zh-TW" altLang="en-US"/>
           </a:p>
@@ -1811,7 +1816,7 @@
           <a:p>
             <a:fld id="{30CB73BA-72EF-43C6-B8BE-F9E08D623C95}" type="datetimeFigureOut">
               <a:rPr lang="zh-TW" altLang="en-US" smtClean="0"/>
-              <a:t>2020/5/16</a:t>
+              <a:t>2020/5/19</a:t>
             </a:fld>
             <a:endParaRPr lang="zh-TW" altLang="en-US"/>
           </a:p>
@@ -1952,7 +1957,7 @@
           <a:p>
             <a:fld id="{30CB73BA-72EF-43C6-B8BE-F9E08D623C95}" type="datetimeFigureOut">
               <a:rPr lang="zh-TW" altLang="en-US" smtClean="0"/>
-              <a:t>2020/5/16</a:t>
+              <a:t>2020/5/19</a:t>
             </a:fld>
             <a:endParaRPr lang="zh-TW" altLang="en-US"/>
           </a:p>
@@ -2065,7 +2070,7 @@
           <a:p>
             <a:fld id="{30CB73BA-72EF-43C6-B8BE-F9E08D623C95}" type="datetimeFigureOut">
               <a:rPr lang="zh-TW" altLang="en-US" smtClean="0"/>
-              <a:t>2020/5/16</a:t>
+              <a:t>2020/5/19</a:t>
             </a:fld>
             <a:endParaRPr lang="zh-TW" altLang="en-US"/>
           </a:p>
@@ -2376,7 +2381,7 @@
           <a:p>
             <a:fld id="{30CB73BA-72EF-43C6-B8BE-F9E08D623C95}" type="datetimeFigureOut">
               <a:rPr lang="zh-TW" altLang="en-US" smtClean="0"/>
-              <a:t>2020/5/16</a:t>
+              <a:t>2020/5/19</a:t>
             </a:fld>
             <a:endParaRPr lang="zh-TW" altLang="en-US"/>
           </a:p>
@@ -2664,7 +2669,7 @@
           <a:p>
             <a:fld id="{30CB73BA-72EF-43C6-B8BE-F9E08D623C95}" type="datetimeFigureOut">
               <a:rPr lang="zh-TW" altLang="en-US" smtClean="0"/>
-              <a:t>2020/5/16</a:t>
+              <a:t>2020/5/19</a:t>
             </a:fld>
             <a:endParaRPr lang="zh-TW" altLang="en-US"/>
           </a:p>
@@ -2905,7 +2910,7 @@
           <a:p>
             <a:fld id="{30CB73BA-72EF-43C6-B8BE-F9E08D623C95}" type="datetimeFigureOut">
               <a:rPr lang="zh-TW" altLang="en-US" smtClean="0"/>
-              <a:t>2020/5/16</a:t>
+              <a:t>2020/5/19</a:t>
             </a:fld>
             <a:endParaRPr lang="zh-TW" altLang="en-US"/>
           </a:p>
@@ -6353,6 +6358,196 @@
           </a:p>
         </p:txBody>
       </p:sp>
+      <p:cxnSp>
+        <p:nvCxnSpPr>
+          <p:cNvPr id="66" name="接點: 弧形 65">
+            <a:extLst>
+              <a:ext uri="{FF2B5EF4-FFF2-40B4-BE49-F238E27FC236}">
+                <a16:creationId xmlns:a16="http://schemas.microsoft.com/office/drawing/2014/main" id="{86FBD6F9-7F58-472F-B44F-FD5197050353}"/>
+              </a:ext>
+            </a:extLst>
+          </p:cNvPr>
+          <p:cNvCxnSpPr>
+            <a:cxnSpLocks/>
+            <a:stCxn id="123" idx="1"/>
+          </p:cNvCxnSpPr>
+          <p:nvPr/>
+        </p:nvCxnSpPr>
+        <p:spPr>
+          <a:xfrm rot="10800000">
+            <a:off x="5305713" y="2845910"/>
+            <a:ext cx="350651" cy="1043837"/>
+          </a:xfrm>
+          <a:prstGeom prst="curvedConnector2">
+            <a:avLst/>
+          </a:prstGeom>
+          <a:ln w="38100">
+            <a:solidFill>
+              <a:schemeClr val="accent2">
+                <a:lumMod val="50000"/>
+              </a:schemeClr>
+            </a:solidFill>
+            <a:tailEnd type="triangle"/>
+          </a:ln>
+        </p:spPr>
+        <p:style>
+          <a:lnRef idx="2">
+            <a:schemeClr val="accent4"/>
+          </a:lnRef>
+          <a:fillRef idx="0">
+            <a:schemeClr val="accent4"/>
+          </a:fillRef>
+          <a:effectRef idx="1">
+            <a:schemeClr val="accent4"/>
+          </a:effectRef>
+          <a:fontRef idx="minor">
+            <a:schemeClr val="tx1"/>
+          </a:fontRef>
+        </p:style>
+      </p:cxnSp>
+      <p:cxnSp>
+        <p:nvCxnSpPr>
+          <p:cNvPr id="67" name="直線單箭頭接點 66">
+            <a:extLst>
+              <a:ext uri="{FF2B5EF4-FFF2-40B4-BE49-F238E27FC236}">
+                <a16:creationId xmlns:a16="http://schemas.microsoft.com/office/drawing/2014/main" id="{0324102A-1E7A-495F-8D9B-20D2310B8BA3}"/>
+              </a:ext>
+            </a:extLst>
+          </p:cNvPr>
+          <p:cNvCxnSpPr>
+            <a:cxnSpLocks/>
+            <a:stCxn id="123" idx="0"/>
+            <a:endCxn id="14" idx="2"/>
+          </p:cNvCxnSpPr>
+          <p:nvPr/>
+        </p:nvCxnSpPr>
+        <p:spPr>
+          <a:xfrm flipH="1" flipV="1">
+            <a:off x="5785608" y="3303484"/>
+            <a:ext cx="83678" cy="387842"/>
+          </a:xfrm>
+          <a:prstGeom prst="straightConnector1">
+            <a:avLst/>
+          </a:prstGeom>
+          <a:ln w="38100">
+            <a:solidFill>
+              <a:schemeClr val="accent2">
+                <a:lumMod val="50000"/>
+              </a:schemeClr>
+            </a:solidFill>
+            <a:tailEnd type="triangle"/>
+          </a:ln>
+        </p:spPr>
+        <p:style>
+          <a:lnRef idx="2">
+            <a:schemeClr val="accent4"/>
+          </a:lnRef>
+          <a:fillRef idx="0">
+            <a:schemeClr val="accent4"/>
+          </a:fillRef>
+          <a:effectRef idx="1">
+            <a:schemeClr val="accent4"/>
+          </a:effectRef>
+          <a:fontRef idx="minor">
+            <a:schemeClr val="tx1"/>
+          </a:fontRef>
+        </p:style>
+      </p:cxnSp>
+      <p:cxnSp>
+        <p:nvCxnSpPr>
+          <p:cNvPr id="76" name="接點: 弧形 75">
+            <a:extLst>
+              <a:ext uri="{FF2B5EF4-FFF2-40B4-BE49-F238E27FC236}">
+                <a16:creationId xmlns:a16="http://schemas.microsoft.com/office/drawing/2014/main" id="{186D410D-B086-4148-8D17-B9BCFC02E541}"/>
+              </a:ext>
+            </a:extLst>
+          </p:cNvPr>
+          <p:cNvCxnSpPr>
+            <a:cxnSpLocks/>
+            <a:stCxn id="125" idx="1"/>
+          </p:cNvCxnSpPr>
+          <p:nvPr/>
+        </p:nvCxnSpPr>
+        <p:spPr>
+          <a:xfrm rot="10800000">
+            <a:off x="9466160" y="2823814"/>
+            <a:ext cx="303356" cy="1065932"/>
+          </a:xfrm>
+          <a:prstGeom prst="curvedConnector2">
+            <a:avLst/>
+          </a:prstGeom>
+          <a:ln w="38100">
+            <a:solidFill>
+              <a:schemeClr val="accent2">
+                <a:lumMod val="50000"/>
+              </a:schemeClr>
+            </a:solidFill>
+            <a:tailEnd type="triangle"/>
+          </a:ln>
+        </p:spPr>
+        <p:style>
+          <a:lnRef idx="2">
+            <a:schemeClr val="accent4"/>
+          </a:lnRef>
+          <a:fillRef idx="0">
+            <a:schemeClr val="accent4"/>
+          </a:fillRef>
+          <a:effectRef idx="1">
+            <a:schemeClr val="accent4"/>
+          </a:effectRef>
+          <a:fontRef idx="minor">
+            <a:schemeClr val="tx1"/>
+          </a:fontRef>
+        </p:style>
+      </p:cxnSp>
+      <p:cxnSp>
+        <p:nvCxnSpPr>
+          <p:cNvPr id="78" name="直線單箭頭接點 77">
+            <a:extLst>
+              <a:ext uri="{FF2B5EF4-FFF2-40B4-BE49-F238E27FC236}">
+                <a16:creationId xmlns:a16="http://schemas.microsoft.com/office/drawing/2014/main" id="{44A35312-FE6D-4F33-B565-7ABA237922D7}"/>
+              </a:ext>
+            </a:extLst>
+          </p:cNvPr>
+          <p:cNvCxnSpPr>
+            <a:cxnSpLocks/>
+            <a:stCxn id="125" idx="0"/>
+            <a:endCxn id="36" idx="2"/>
+          </p:cNvCxnSpPr>
+          <p:nvPr/>
+        </p:nvCxnSpPr>
+        <p:spPr>
+          <a:xfrm flipV="1">
+            <a:off x="9967516" y="3295780"/>
+            <a:ext cx="1" cy="395546"/>
+          </a:xfrm>
+          <a:prstGeom prst="straightConnector1">
+            <a:avLst/>
+          </a:prstGeom>
+          <a:ln w="38100">
+            <a:solidFill>
+              <a:schemeClr val="accent2">
+                <a:lumMod val="50000"/>
+              </a:schemeClr>
+            </a:solidFill>
+            <a:tailEnd type="triangle"/>
+          </a:ln>
+        </p:spPr>
+        <p:style>
+          <a:lnRef idx="2">
+            <a:schemeClr val="accent4"/>
+          </a:lnRef>
+          <a:fillRef idx="0">
+            <a:schemeClr val="accent4"/>
+          </a:fillRef>
+          <a:effectRef idx="1">
+            <a:schemeClr val="accent4"/>
+          </a:effectRef>
+          <a:fontRef idx="minor">
+            <a:schemeClr val="tx1"/>
+          </a:fontRef>
+        </p:style>
+      </p:cxnSp>
     </p:spTree>
     <p:extLst>
       <p:ext uri="{BB962C8B-B14F-4D97-AF65-F5344CB8AC3E}">
@@ -6427,7 +6622,7 @@
             <a:pPr algn="ctr"/>
             <a:r>
               <a:rPr lang="en-US" altLang="zh-TW" dirty="0"/>
-              <a:t>Input Layer (99, 39)</a:t>
+              <a:t>Audio Information (99, 39)</a:t>
             </a:r>
             <a:endParaRPr lang="zh-TW" altLang="en-US" dirty="0"/>
           </a:p>
@@ -6453,6 +6648,31 @@
           <a:prstGeom prst="roundRect">
             <a:avLst/>
           </a:prstGeom>
+          <a:gradFill flip="none" rotWithShape="1">
+            <a:gsLst>
+              <a:gs pos="0">
+                <a:schemeClr val="accent2">
+                  <a:tint val="66000"/>
+                  <a:satMod val="160000"/>
+                </a:schemeClr>
+              </a:gs>
+              <a:gs pos="50000">
+                <a:schemeClr val="accent2">
+                  <a:tint val="44500"/>
+                  <a:satMod val="160000"/>
+                </a:schemeClr>
+              </a:gs>
+              <a:gs pos="100000">
+                <a:schemeClr val="accent2">
+                  <a:tint val="23500"/>
+                  <a:satMod val="160000"/>
+                </a:schemeClr>
+              </a:gs>
+            </a:gsLst>
+            <a:lin ang="5400000" scaled="1"/>
+            <a:tileRect/>
+          </a:gradFill>
+          <a:ln w="38100"/>
         </p:spPr>
         <p:style>
           <a:lnRef idx="2">
@@ -6492,12 +6712,37 @@
         </p:nvSpPr>
         <p:spPr>
           <a:xfrm>
-            <a:off x="1057013" y="856145"/>
+            <a:off x="1057012" y="804903"/>
             <a:ext cx="5410899" cy="1677874"/>
           </a:xfrm>
           <a:prstGeom prst="roundRect">
             <a:avLst/>
           </a:prstGeom>
+          <a:gradFill flip="none" rotWithShape="1">
+            <a:gsLst>
+              <a:gs pos="0">
+                <a:schemeClr val="accent6">
+                  <a:tint val="66000"/>
+                  <a:satMod val="160000"/>
+                </a:schemeClr>
+              </a:gs>
+              <a:gs pos="50000">
+                <a:schemeClr val="accent6">
+                  <a:tint val="44500"/>
+                  <a:satMod val="160000"/>
+                </a:schemeClr>
+              </a:gs>
+              <a:gs pos="100000">
+                <a:schemeClr val="accent6">
+                  <a:tint val="23500"/>
+                  <a:satMod val="160000"/>
+                </a:schemeClr>
+              </a:gs>
+            </a:gsLst>
+            <a:lin ang="5400000" scaled="1"/>
+            <a:tileRect/>
+          </a:gradFill>
+          <a:ln w="38100"/>
         </p:spPr>
         <p:style>
           <a:lnRef idx="2">
@@ -6538,12 +6783,37 @@
         </p:nvSpPr>
         <p:spPr>
           <a:xfrm>
-            <a:off x="6803471" y="1291904"/>
-            <a:ext cx="3993160" cy="3969552"/>
+            <a:off x="6995884" y="1888014"/>
+            <a:ext cx="3993160" cy="3306745"/>
           </a:xfrm>
           <a:prstGeom prst="roundRect">
             <a:avLst/>
           </a:prstGeom>
+          <a:gradFill flip="none" rotWithShape="1">
+            <a:gsLst>
+              <a:gs pos="0">
+                <a:schemeClr val="accent4">
+                  <a:tint val="66000"/>
+                  <a:satMod val="160000"/>
+                </a:schemeClr>
+              </a:gs>
+              <a:gs pos="50000">
+                <a:schemeClr val="accent4">
+                  <a:tint val="44500"/>
+                  <a:satMod val="160000"/>
+                </a:schemeClr>
+              </a:gs>
+              <a:gs pos="100000">
+                <a:schemeClr val="accent4">
+                  <a:tint val="23500"/>
+                  <a:satMod val="160000"/>
+                </a:schemeClr>
+              </a:gs>
+            </a:gsLst>
+            <a:lin ang="5400000" scaled="1"/>
+            <a:tileRect/>
+          </a:gradFill>
+          <a:ln w="38100"/>
         </p:spPr>
         <p:style>
           <a:lnRef idx="2">
@@ -6898,175 +7168,414 @@
           </a:p>
         </p:txBody>
       </p:sp>
-      <p:sp>
-        <p:nvSpPr>
-          <p:cNvPr id="14" name="矩形 13">
-            <a:extLst>
-              <a:ext uri="{FF2B5EF4-FFF2-40B4-BE49-F238E27FC236}">
-                <a16:creationId xmlns:a16="http://schemas.microsoft.com/office/drawing/2014/main" id="{C86EABDE-022D-4AA1-93F5-4C485CAB7106}"/>
-              </a:ext>
-            </a:extLst>
-          </p:cNvPr>
-          <p:cNvSpPr/>
-          <p:nvPr/>
-        </p:nvSpPr>
-        <p:spPr>
+      <p:grpSp>
+        <p:nvGrpSpPr>
+          <p:cNvPr id="3" name="群組 2">
+            <a:extLst>
+              <a:ext uri="{FF2B5EF4-FFF2-40B4-BE49-F238E27FC236}">
+                <a16:creationId xmlns:a16="http://schemas.microsoft.com/office/drawing/2014/main" id="{6C6D51E4-090D-4787-A3ED-6CF706203EDA}"/>
+              </a:ext>
+            </a:extLst>
+          </p:cNvPr>
+          <p:cNvGrpSpPr/>
+          <p:nvPr/>
+        </p:nvGrpSpPr>
+        <p:grpSpPr>
           <a:xfrm>
             <a:off x="461394" y="2613170"/>
             <a:ext cx="1300294" cy="934479"/>
-          </a:xfrm>
-          <a:prstGeom prst="rect">
-            <a:avLst/>
-          </a:prstGeom>
-          <a:solidFill>
-            <a:schemeClr val="bg1"/>
-          </a:solidFill>
-          <a:ln w="76200"/>
-        </p:spPr>
-        <p:style>
-          <a:lnRef idx="2">
-            <a:schemeClr val="accent2">
-              <a:shade val="50000"/>
-            </a:schemeClr>
-          </a:lnRef>
-          <a:fillRef idx="1">
-            <a:schemeClr val="accent2"/>
-          </a:fillRef>
-          <a:effectRef idx="0">
-            <a:schemeClr val="accent2"/>
-          </a:effectRef>
-          <a:fontRef idx="minor">
-            <a:schemeClr val="lt1"/>
-          </a:fontRef>
-        </p:style>
-        <p:txBody>
-          <a:bodyPr rtlCol="0" anchor="ctr"/>
-          <a:lstStyle/>
-          <a:p>
-            <a:pPr algn="ctr"/>
-            <a:endParaRPr lang="zh-TW" altLang="en-US"/>
-          </a:p>
-        </p:txBody>
-      </p:sp>
-      <p:sp>
-        <p:nvSpPr>
-          <p:cNvPr id="15" name="矩形 14">
-            <a:extLst>
-              <a:ext uri="{FF2B5EF4-FFF2-40B4-BE49-F238E27FC236}">
-                <a16:creationId xmlns:a16="http://schemas.microsoft.com/office/drawing/2014/main" id="{360A33B5-B392-4F35-9E55-64995BC45006}"/>
-              </a:ext>
-            </a:extLst>
-          </p:cNvPr>
-          <p:cNvSpPr/>
-          <p:nvPr/>
-        </p:nvSpPr>
-        <p:spPr>
-          <a:xfrm>
-            <a:off x="461394" y="2613170"/>
-            <a:ext cx="1191237" cy="815830"/>
-          </a:xfrm>
-          <a:prstGeom prst="rect">
-            <a:avLst/>
-          </a:prstGeom>
-          <a:solidFill>
-            <a:schemeClr val="accent2">
-              <a:lumMod val="60000"/>
-              <a:lumOff val="40000"/>
-            </a:schemeClr>
-          </a:solidFill>
-          <a:ln w="57150"/>
-        </p:spPr>
-        <p:style>
-          <a:lnRef idx="2">
-            <a:schemeClr val="accent2">
-              <a:shade val="50000"/>
-            </a:schemeClr>
-          </a:lnRef>
-          <a:fillRef idx="1">
-            <a:schemeClr val="accent2"/>
-          </a:fillRef>
-          <a:effectRef idx="0">
-            <a:schemeClr val="accent2"/>
-          </a:effectRef>
-          <a:fontRef idx="minor">
-            <a:schemeClr val="lt1"/>
-          </a:fontRef>
-        </p:style>
-        <p:txBody>
-          <a:bodyPr rtlCol="0" anchor="ctr"/>
-          <a:lstStyle/>
-          <a:p>
-            <a:pPr algn="ctr"/>
-            <a:r>
-              <a:rPr lang="en-US" altLang="zh-TW" sz="2000" dirty="0"/>
-              <a:t>Encoder</a:t>
-            </a:r>
-            <a:endParaRPr lang="zh-TW" altLang="en-US" sz="2000" dirty="0"/>
-          </a:p>
-        </p:txBody>
-      </p:sp>
-      <p:sp>
-        <p:nvSpPr>
-          <p:cNvPr id="16" name="矩形 15">
-            <a:extLst>
-              <a:ext uri="{FF2B5EF4-FFF2-40B4-BE49-F238E27FC236}">
-                <a16:creationId xmlns:a16="http://schemas.microsoft.com/office/drawing/2014/main" id="{8C35114B-55AC-4FC5-95E2-F4860CB3A769}"/>
-              </a:ext>
-            </a:extLst>
-          </p:cNvPr>
-          <p:cNvSpPr/>
-          <p:nvPr/>
-        </p:nvSpPr>
-        <p:spPr>
-          <a:xfrm>
-            <a:off x="461394" y="531806"/>
-            <a:ext cx="1300294" cy="934479"/>
-          </a:xfrm>
-          <a:prstGeom prst="rect">
-            <a:avLst/>
-          </a:prstGeom>
-          <a:solidFill>
-            <a:schemeClr val="bg1"/>
-          </a:solidFill>
-          <a:ln w="76200">
+            <a:chOff x="461394" y="2613170"/>
+            <a:chExt cx="1300294" cy="934479"/>
+          </a:xfrm>
+        </p:grpSpPr>
+        <p:sp>
+          <p:nvSpPr>
+            <p:cNvPr id="14" name="矩形 13">
+              <a:extLst>
+                <a:ext uri="{FF2B5EF4-FFF2-40B4-BE49-F238E27FC236}">
+                  <a16:creationId xmlns:a16="http://schemas.microsoft.com/office/drawing/2014/main" id="{C86EABDE-022D-4AA1-93F5-4C485CAB7106}"/>
+                </a:ext>
+              </a:extLst>
+            </p:cNvPr>
+            <p:cNvSpPr/>
+            <p:nvPr/>
+          </p:nvSpPr>
+          <p:spPr>
+            <a:xfrm>
+              <a:off x="461394" y="2613170"/>
+              <a:ext cx="1300294" cy="934479"/>
+            </a:xfrm>
+            <a:prstGeom prst="rect">
+              <a:avLst/>
+            </a:prstGeom>
             <a:solidFill>
-              <a:schemeClr val="accent6">
-                <a:lumMod val="75000"/>
+              <a:schemeClr val="bg1"/>
+            </a:solidFill>
+            <a:ln w="76200"/>
+          </p:spPr>
+          <p:style>
+            <a:lnRef idx="2">
+              <a:schemeClr val="accent2">
+                <a:shade val="50000"/>
+              </a:schemeClr>
+            </a:lnRef>
+            <a:fillRef idx="1">
+              <a:schemeClr val="accent2"/>
+            </a:fillRef>
+            <a:effectRef idx="0">
+              <a:schemeClr val="accent2"/>
+            </a:effectRef>
+            <a:fontRef idx="minor">
+              <a:schemeClr val="lt1"/>
+            </a:fontRef>
+          </p:style>
+          <p:txBody>
+            <a:bodyPr rtlCol="0" anchor="ctr"/>
+            <a:lstStyle/>
+            <a:p>
+              <a:pPr algn="ctr"/>
+              <a:endParaRPr lang="zh-TW" altLang="en-US"/>
+            </a:p>
+          </p:txBody>
+        </p:sp>
+        <p:sp>
+          <p:nvSpPr>
+            <p:cNvPr id="15" name="矩形 14">
+              <a:extLst>
+                <a:ext uri="{FF2B5EF4-FFF2-40B4-BE49-F238E27FC236}">
+                  <a16:creationId xmlns:a16="http://schemas.microsoft.com/office/drawing/2014/main" id="{360A33B5-B392-4F35-9E55-64995BC45006}"/>
+                </a:ext>
+              </a:extLst>
+            </p:cNvPr>
+            <p:cNvSpPr/>
+            <p:nvPr/>
+          </p:nvSpPr>
+          <p:spPr>
+            <a:xfrm>
+              <a:off x="461394" y="2613170"/>
+              <a:ext cx="1191237" cy="815830"/>
+            </a:xfrm>
+            <a:prstGeom prst="rect">
+              <a:avLst/>
+            </a:prstGeom>
+            <a:solidFill>
+              <a:schemeClr val="accent2">
+                <a:lumMod val="60000"/>
+                <a:lumOff val="40000"/>
               </a:schemeClr>
             </a:solidFill>
-          </a:ln>
-        </p:spPr>
-        <p:style>
-          <a:lnRef idx="2">
-            <a:schemeClr val="accent2">
-              <a:shade val="50000"/>
-            </a:schemeClr>
-          </a:lnRef>
-          <a:fillRef idx="1">
-            <a:schemeClr val="accent2"/>
-          </a:fillRef>
-          <a:effectRef idx="0">
-            <a:schemeClr val="accent2"/>
-          </a:effectRef>
-          <a:fontRef idx="minor">
-            <a:schemeClr val="lt1"/>
-          </a:fontRef>
-        </p:style>
-        <p:txBody>
-          <a:bodyPr rtlCol="0" anchor="ctr"/>
-          <a:lstStyle/>
-          <a:p>
-            <a:pPr algn="ctr"/>
-            <a:endParaRPr lang="zh-TW" altLang="en-US"/>
-          </a:p>
-        </p:txBody>
-      </p:sp>
-      <p:sp>
-        <p:nvSpPr>
-          <p:cNvPr id="17" name="矩形 16">
-            <a:extLst>
-              <a:ext uri="{FF2B5EF4-FFF2-40B4-BE49-F238E27FC236}">
-                <a16:creationId xmlns:a16="http://schemas.microsoft.com/office/drawing/2014/main" id="{187A872C-010B-44F8-ADCA-D25DE90834E9}"/>
+            <a:ln w="57150"/>
+          </p:spPr>
+          <p:style>
+            <a:lnRef idx="2">
+              <a:schemeClr val="accent2">
+                <a:shade val="50000"/>
+              </a:schemeClr>
+            </a:lnRef>
+            <a:fillRef idx="1">
+              <a:schemeClr val="accent2"/>
+            </a:fillRef>
+            <a:effectRef idx="0">
+              <a:schemeClr val="accent2"/>
+            </a:effectRef>
+            <a:fontRef idx="minor">
+              <a:schemeClr val="lt1"/>
+            </a:fontRef>
+          </p:style>
+          <p:txBody>
+            <a:bodyPr rtlCol="0" anchor="ctr"/>
+            <a:lstStyle/>
+            <a:p>
+              <a:pPr algn="ctr"/>
+              <a:r>
+                <a:rPr lang="en-US" altLang="zh-TW" sz="2000" b="1" dirty="0"/>
+                <a:t>Encoder</a:t>
+              </a:r>
+              <a:endParaRPr lang="zh-TW" altLang="en-US" sz="2000" b="1" dirty="0"/>
+            </a:p>
+          </p:txBody>
+        </p:sp>
+      </p:grpSp>
+      <p:grpSp>
+        <p:nvGrpSpPr>
+          <p:cNvPr id="2" name="群組 1">
+            <a:extLst>
+              <a:ext uri="{FF2B5EF4-FFF2-40B4-BE49-F238E27FC236}">
+                <a16:creationId xmlns:a16="http://schemas.microsoft.com/office/drawing/2014/main" id="{3046F615-F9CC-4FF4-B9E0-78566400FA9E}"/>
+              </a:ext>
+            </a:extLst>
+          </p:cNvPr>
+          <p:cNvGrpSpPr/>
+          <p:nvPr/>
+        </p:nvGrpSpPr>
+        <p:grpSpPr>
+          <a:xfrm>
+            <a:off x="441809" y="407650"/>
+            <a:ext cx="1300294" cy="934479"/>
+            <a:chOff x="461394" y="531806"/>
+            <a:chExt cx="1300294" cy="934479"/>
+          </a:xfrm>
+        </p:grpSpPr>
+        <p:sp>
+          <p:nvSpPr>
+            <p:cNvPr id="16" name="矩形 15">
+              <a:extLst>
+                <a:ext uri="{FF2B5EF4-FFF2-40B4-BE49-F238E27FC236}">
+                  <a16:creationId xmlns:a16="http://schemas.microsoft.com/office/drawing/2014/main" id="{8C35114B-55AC-4FC5-95E2-F4860CB3A769}"/>
+                </a:ext>
+              </a:extLst>
+            </p:cNvPr>
+            <p:cNvSpPr/>
+            <p:nvPr/>
+          </p:nvSpPr>
+          <p:spPr>
+            <a:xfrm>
+              <a:off x="461394" y="531806"/>
+              <a:ext cx="1300294" cy="934479"/>
+            </a:xfrm>
+            <a:prstGeom prst="rect">
+              <a:avLst/>
+            </a:prstGeom>
+            <a:solidFill>
+              <a:schemeClr val="bg1"/>
+            </a:solidFill>
+            <a:ln w="76200">
+              <a:solidFill>
+                <a:schemeClr val="accent6">
+                  <a:lumMod val="75000"/>
+                </a:schemeClr>
+              </a:solidFill>
+            </a:ln>
+          </p:spPr>
+          <p:style>
+            <a:lnRef idx="2">
+              <a:schemeClr val="accent2">
+                <a:shade val="50000"/>
+              </a:schemeClr>
+            </a:lnRef>
+            <a:fillRef idx="1">
+              <a:schemeClr val="accent2"/>
+            </a:fillRef>
+            <a:effectRef idx="0">
+              <a:schemeClr val="accent2"/>
+            </a:effectRef>
+            <a:fontRef idx="minor">
+              <a:schemeClr val="lt1"/>
+            </a:fontRef>
+          </p:style>
+          <p:txBody>
+            <a:bodyPr rtlCol="0" anchor="ctr"/>
+            <a:lstStyle/>
+            <a:p>
+              <a:pPr algn="ctr"/>
+              <a:endParaRPr lang="zh-TW" altLang="en-US"/>
+            </a:p>
+          </p:txBody>
+        </p:sp>
+        <p:sp>
+          <p:nvSpPr>
+            <p:cNvPr id="17" name="矩形 16">
+              <a:extLst>
+                <a:ext uri="{FF2B5EF4-FFF2-40B4-BE49-F238E27FC236}">
+                  <a16:creationId xmlns:a16="http://schemas.microsoft.com/office/drawing/2014/main" id="{187A872C-010B-44F8-ADCA-D25DE90834E9}"/>
+                </a:ext>
+              </a:extLst>
+            </p:cNvPr>
+            <p:cNvSpPr/>
+            <p:nvPr/>
+          </p:nvSpPr>
+          <p:spPr>
+            <a:xfrm>
+              <a:off x="461394" y="531806"/>
+              <a:ext cx="1191237" cy="815830"/>
+            </a:xfrm>
+            <a:prstGeom prst="rect">
+              <a:avLst/>
+            </a:prstGeom>
+            <a:solidFill>
+              <a:srgbClr val="92D050"/>
+            </a:solidFill>
+            <a:ln w="38100">
+              <a:solidFill>
+                <a:schemeClr val="accent6">
+                  <a:lumMod val="75000"/>
+                </a:schemeClr>
+              </a:solidFill>
+            </a:ln>
+          </p:spPr>
+          <p:style>
+            <a:lnRef idx="2">
+              <a:schemeClr val="accent2">
+                <a:shade val="50000"/>
+              </a:schemeClr>
+            </a:lnRef>
+            <a:fillRef idx="1">
+              <a:schemeClr val="accent2"/>
+            </a:fillRef>
+            <a:effectRef idx="0">
+              <a:schemeClr val="accent2"/>
+            </a:effectRef>
+            <a:fontRef idx="minor">
+              <a:schemeClr val="lt1"/>
+            </a:fontRef>
+          </p:style>
+          <p:txBody>
+            <a:bodyPr rtlCol="0" anchor="ctr"/>
+            <a:lstStyle/>
+            <a:p>
+              <a:pPr algn="ctr"/>
+              <a:r>
+                <a:rPr lang="en-US" altLang="zh-TW" sz="2000" b="1" dirty="0"/>
+                <a:t>Attention</a:t>
+              </a:r>
+              <a:endParaRPr lang="zh-TW" altLang="en-US" sz="2000" b="1" dirty="0"/>
+            </a:p>
+          </p:txBody>
+        </p:sp>
+      </p:grpSp>
+      <p:grpSp>
+        <p:nvGrpSpPr>
+          <p:cNvPr id="4" name="群組 3">
+            <a:extLst>
+              <a:ext uri="{FF2B5EF4-FFF2-40B4-BE49-F238E27FC236}">
+                <a16:creationId xmlns:a16="http://schemas.microsoft.com/office/drawing/2014/main" id="{5198014F-3EB6-43B8-B5CE-EF2050CF28F5}"/>
+              </a:ext>
+            </a:extLst>
+          </p:cNvPr>
+          <p:cNvGrpSpPr/>
+          <p:nvPr/>
+        </p:nvGrpSpPr>
+        <p:grpSpPr>
+          <a:xfrm>
+            <a:off x="10178990" y="1502785"/>
+            <a:ext cx="1300294" cy="934479"/>
+            <a:chOff x="10212198" y="795571"/>
+            <a:chExt cx="1300294" cy="934479"/>
+          </a:xfrm>
+        </p:grpSpPr>
+        <p:sp>
+          <p:nvSpPr>
+            <p:cNvPr id="20" name="矩形 19">
+              <a:extLst>
+                <a:ext uri="{FF2B5EF4-FFF2-40B4-BE49-F238E27FC236}">
+                  <a16:creationId xmlns:a16="http://schemas.microsoft.com/office/drawing/2014/main" id="{F7BDBD17-9FF4-4E35-B02D-DF91A4B7CE1E}"/>
+                </a:ext>
+              </a:extLst>
+            </p:cNvPr>
+            <p:cNvSpPr/>
+            <p:nvPr/>
+          </p:nvSpPr>
+          <p:spPr>
+            <a:xfrm>
+              <a:off x="10212198" y="795571"/>
+              <a:ext cx="1300294" cy="934479"/>
+            </a:xfrm>
+            <a:prstGeom prst="rect">
+              <a:avLst/>
+            </a:prstGeom>
+            <a:solidFill>
+              <a:schemeClr val="bg1"/>
+            </a:solidFill>
+            <a:ln w="76200">
+              <a:solidFill>
+                <a:schemeClr val="accent2">
+                  <a:lumMod val="75000"/>
+                </a:schemeClr>
+              </a:solidFill>
+            </a:ln>
+          </p:spPr>
+          <p:style>
+            <a:lnRef idx="2">
+              <a:schemeClr val="accent2">
+                <a:shade val="50000"/>
+              </a:schemeClr>
+            </a:lnRef>
+            <a:fillRef idx="1">
+              <a:schemeClr val="accent2"/>
+            </a:fillRef>
+            <a:effectRef idx="0">
+              <a:schemeClr val="accent2"/>
+            </a:effectRef>
+            <a:fontRef idx="minor">
+              <a:schemeClr val="lt1"/>
+            </a:fontRef>
+          </p:style>
+          <p:txBody>
+            <a:bodyPr rtlCol="0" anchor="ctr"/>
+            <a:lstStyle/>
+            <a:p>
+              <a:pPr algn="ctr"/>
+              <a:endParaRPr lang="zh-TW" altLang="en-US"/>
+            </a:p>
+          </p:txBody>
+        </p:sp>
+        <p:sp>
+          <p:nvSpPr>
+            <p:cNvPr id="21" name="矩形 20">
+              <a:extLst>
+                <a:ext uri="{FF2B5EF4-FFF2-40B4-BE49-F238E27FC236}">
+                  <a16:creationId xmlns:a16="http://schemas.microsoft.com/office/drawing/2014/main" id="{CAAF1114-E819-4F85-A994-3AA1A6438864}"/>
+                </a:ext>
+              </a:extLst>
+            </p:cNvPr>
+            <p:cNvSpPr/>
+            <p:nvPr/>
+          </p:nvSpPr>
+          <p:spPr>
+            <a:xfrm>
+              <a:off x="10321255" y="795571"/>
+              <a:ext cx="1191237" cy="815830"/>
+            </a:xfrm>
+            <a:prstGeom prst="rect">
+              <a:avLst/>
+            </a:prstGeom>
+            <a:solidFill>
+              <a:srgbClr val="FFC000"/>
+            </a:solidFill>
+            <a:ln w="38100">
+              <a:solidFill>
+                <a:schemeClr val="accent2">
+                  <a:lumMod val="75000"/>
+                </a:schemeClr>
+              </a:solidFill>
+            </a:ln>
+          </p:spPr>
+          <p:style>
+            <a:lnRef idx="2">
+              <a:schemeClr val="accent2">
+                <a:shade val="50000"/>
+              </a:schemeClr>
+            </a:lnRef>
+            <a:fillRef idx="1">
+              <a:schemeClr val="accent2"/>
+            </a:fillRef>
+            <a:effectRef idx="0">
+              <a:schemeClr val="accent2"/>
+            </a:effectRef>
+            <a:fontRef idx="minor">
+              <a:schemeClr val="lt1"/>
+            </a:fontRef>
+          </p:style>
+          <p:txBody>
+            <a:bodyPr rtlCol="0" anchor="ctr"/>
+            <a:lstStyle/>
+            <a:p>
+              <a:pPr algn="ctr"/>
+              <a:r>
+                <a:rPr lang="en-US" altLang="zh-TW" sz="2000" b="1" dirty="0"/>
+                <a:t>Decoder</a:t>
+              </a:r>
+              <a:endParaRPr lang="zh-TW" altLang="en-US" sz="2000" b="1" dirty="0"/>
+            </a:p>
+          </p:txBody>
+        </p:sp>
+      </p:grpSp>
+      <p:sp>
+        <p:nvSpPr>
+          <p:cNvPr id="22" name="矩形 21">
+            <a:extLst>
+              <a:ext uri="{FF2B5EF4-FFF2-40B4-BE49-F238E27FC236}">
+                <a16:creationId xmlns:a16="http://schemas.microsoft.com/office/drawing/2014/main" id="{984CF4BB-E2C8-4BD0-8622-DD2D755018AA}"/>
               </a:ext>
             </a:extLst>
           </p:cNvPr>
@@ -7075,183 +7584,7 @@
         </p:nvSpPr>
         <p:spPr>
           <a:xfrm>
-            <a:off x="461394" y="531806"/>
-            <a:ext cx="1191237" cy="815830"/>
-          </a:xfrm>
-          <a:prstGeom prst="rect">
-            <a:avLst/>
-          </a:prstGeom>
-          <a:solidFill>
-            <a:srgbClr val="92D050"/>
-          </a:solidFill>
-          <a:ln w="38100">
-            <a:solidFill>
-              <a:schemeClr val="accent6">
-                <a:lumMod val="75000"/>
-              </a:schemeClr>
-            </a:solidFill>
-          </a:ln>
-        </p:spPr>
-        <p:style>
-          <a:lnRef idx="2">
-            <a:schemeClr val="accent2">
-              <a:shade val="50000"/>
-            </a:schemeClr>
-          </a:lnRef>
-          <a:fillRef idx="1">
-            <a:schemeClr val="accent2"/>
-          </a:fillRef>
-          <a:effectRef idx="0">
-            <a:schemeClr val="accent2"/>
-          </a:effectRef>
-          <a:fontRef idx="minor">
-            <a:schemeClr val="lt1"/>
-          </a:fontRef>
-        </p:style>
-        <p:txBody>
-          <a:bodyPr rtlCol="0" anchor="ctr"/>
-          <a:lstStyle/>
-          <a:p>
-            <a:pPr algn="ctr"/>
-            <a:r>
-              <a:rPr lang="en-US" altLang="zh-TW" sz="2000" dirty="0"/>
-              <a:t>Attention</a:t>
-            </a:r>
-            <a:endParaRPr lang="zh-TW" altLang="en-US" sz="2000" dirty="0"/>
-          </a:p>
-        </p:txBody>
-      </p:sp>
-      <p:sp>
-        <p:nvSpPr>
-          <p:cNvPr id="20" name="矩形 19">
-            <a:extLst>
-              <a:ext uri="{FF2B5EF4-FFF2-40B4-BE49-F238E27FC236}">
-                <a16:creationId xmlns:a16="http://schemas.microsoft.com/office/drawing/2014/main" id="{F7BDBD17-9FF4-4E35-B02D-DF91A4B7CE1E}"/>
-              </a:ext>
-            </a:extLst>
-          </p:cNvPr>
-          <p:cNvSpPr/>
-          <p:nvPr/>
-        </p:nvSpPr>
-        <p:spPr>
-          <a:xfrm>
-            <a:off x="10212198" y="795571"/>
-            <a:ext cx="1300294" cy="934479"/>
-          </a:xfrm>
-          <a:prstGeom prst="rect">
-            <a:avLst/>
-          </a:prstGeom>
-          <a:solidFill>
-            <a:schemeClr val="bg1"/>
-          </a:solidFill>
-          <a:ln w="76200">
-            <a:solidFill>
-              <a:schemeClr val="accent2">
-                <a:lumMod val="75000"/>
-              </a:schemeClr>
-            </a:solidFill>
-          </a:ln>
-        </p:spPr>
-        <p:style>
-          <a:lnRef idx="2">
-            <a:schemeClr val="accent2">
-              <a:shade val="50000"/>
-            </a:schemeClr>
-          </a:lnRef>
-          <a:fillRef idx="1">
-            <a:schemeClr val="accent2"/>
-          </a:fillRef>
-          <a:effectRef idx="0">
-            <a:schemeClr val="accent2"/>
-          </a:effectRef>
-          <a:fontRef idx="minor">
-            <a:schemeClr val="lt1"/>
-          </a:fontRef>
-        </p:style>
-        <p:txBody>
-          <a:bodyPr rtlCol="0" anchor="ctr"/>
-          <a:lstStyle/>
-          <a:p>
-            <a:pPr algn="ctr"/>
-            <a:endParaRPr lang="zh-TW" altLang="en-US"/>
-          </a:p>
-        </p:txBody>
-      </p:sp>
-      <p:sp>
-        <p:nvSpPr>
-          <p:cNvPr id="21" name="矩形 20">
-            <a:extLst>
-              <a:ext uri="{FF2B5EF4-FFF2-40B4-BE49-F238E27FC236}">
-                <a16:creationId xmlns:a16="http://schemas.microsoft.com/office/drawing/2014/main" id="{CAAF1114-E819-4F85-A994-3AA1A6438864}"/>
-              </a:ext>
-            </a:extLst>
-          </p:cNvPr>
-          <p:cNvSpPr/>
-          <p:nvPr/>
-        </p:nvSpPr>
-        <p:spPr>
-          <a:xfrm>
-            <a:off x="10321255" y="795571"/>
-            <a:ext cx="1191237" cy="815830"/>
-          </a:xfrm>
-          <a:prstGeom prst="rect">
-            <a:avLst/>
-          </a:prstGeom>
-          <a:solidFill>
-            <a:srgbClr val="FFC000"/>
-          </a:solidFill>
-          <a:ln w="38100">
-            <a:solidFill>
-              <a:schemeClr val="accent2">
-                <a:lumMod val="75000"/>
-              </a:schemeClr>
-            </a:solidFill>
-          </a:ln>
-        </p:spPr>
-        <p:style>
-          <a:lnRef idx="2">
-            <a:schemeClr val="accent2">
-              <a:shade val="50000"/>
-            </a:schemeClr>
-          </a:lnRef>
-          <a:fillRef idx="1">
-            <a:schemeClr val="accent2"/>
-          </a:fillRef>
-          <a:effectRef idx="0">
-            <a:schemeClr val="accent2"/>
-          </a:effectRef>
-          <a:fontRef idx="minor">
-            <a:schemeClr val="lt1"/>
-          </a:fontRef>
-        </p:style>
-        <p:txBody>
-          <a:bodyPr rtlCol="0" anchor="ctr"/>
-          <a:lstStyle/>
-          <a:p>
-            <a:pPr algn="ctr"/>
-            <a:r>
-              <a:rPr lang="en-US" altLang="zh-TW" sz="2000" dirty="0"/>
-              <a:t>Decoder</a:t>
-            </a:r>
-            <a:endParaRPr lang="zh-TW" altLang="en-US" sz="2000" dirty="0"/>
-          </a:p>
-        </p:txBody>
-      </p:sp>
-      <p:sp>
-        <p:nvSpPr>
-          <p:cNvPr id="22" name="矩形 21">
-            <a:extLst>
-              <a:ext uri="{FF2B5EF4-FFF2-40B4-BE49-F238E27FC236}">
-                <a16:creationId xmlns:a16="http://schemas.microsoft.com/office/drawing/2014/main" id="{984CF4BB-E2C8-4BD0-8622-DD2D755018AA}"/>
-              </a:ext>
-            </a:extLst>
-          </p:cNvPr>
-          <p:cNvSpPr/>
-          <p:nvPr/>
-        </p:nvSpPr>
-        <p:spPr>
-          <a:xfrm>
-            <a:off x="7281644" y="5456295"/>
+            <a:off x="7474057" y="5389598"/>
             <a:ext cx="1858011" cy="664420"/>
           </a:xfrm>
           <a:prstGeom prst="rect">
@@ -7281,7 +7614,7 @@
             <a:pPr algn="ctr"/>
             <a:r>
               <a:rPr lang="en-US" altLang="zh-TW" dirty="0"/>
-              <a:t>Output Layer (7)</a:t>
+              <a:t>Phonemes (7)</a:t>
             </a:r>
             <a:endParaRPr lang="zh-TW" altLang="en-US" dirty="0"/>
           </a:p>
@@ -7301,7 +7634,7 @@
         </p:nvSpPr>
         <p:spPr>
           <a:xfrm>
-            <a:off x="7278847" y="3176292"/>
+            <a:off x="7471260" y="3109595"/>
             <a:ext cx="3042407" cy="727786"/>
           </a:xfrm>
           <a:prstGeom prst="roundRect">
@@ -7367,7 +7700,7 @@
         </p:nvSpPr>
         <p:spPr>
           <a:xfrm>
-            <a:off x="7281644" y="4138841"/>
+            <a:off x="7474057" y="4072144"/>
             <a:ext cx="3050796" cy="649448"/>
           </a:xfrm>
           <a:prstGeom prst="roundRect">
@@ -7433,14 +7766,14 @@
         </p:nvSpPr>
         <p:spPr>
           <a:xfrm>
-            <a:off x="7274652" y="1908656"/>
+            <a:off x="7469257" y="849783"/>
             <a:ext cx="3050796" cy="462379"/>
           </a:xfrm>
           <a:prstGeom prst="roundRect">
             <a:avLst/>
           </a:prstGeom>
           <a:solidFill>
-            <a:schemeClr val="bg1"/>
+            <a:schemeClr val="accent2"/>
           </a:solidFill>
           <a:ln>
             <a:solidFill>
@@ -10284,7 +10617,7 @@
         </p:nvSpPr>
         <p:spPr>
           <a:xfrm>
-            <a:off x="7520307" y="3408433"/>
+            <a:off x="7712720" y="3341736"/>
             <a:ext cx="394282" cy="238343"/>
           </a:xfrm>
           <a:prstGeom prst="roundRect">
@@ -10340,7 +10673,7 @@
         </p:nvSpPr>
         <p:spPr>
           <a:xfrm>
-            <a:off x="8095066" y="3404556"/>
+            <a:off x="8287479" y="3337859"/>
             <a:ext cx="394282" cy="238343"/>
           </a:xfrm>
           <a:prstGeom prst="roundRect">
@@ -10396,7 +10729,7 @@
         </p:nvSpPr>
         <p:spPr>
           <a:xfrm>
-            <a:off x="9108426" y="3408357"/>
+            <a:off x="9300839" y="3341660"/>
             <a:ext cx="394282" cy="238343"/>
           </a:xfrm>
           <a:prstGeom prst="roundRect">
@@ -10440,142 +10773,6 @@
       </p:sp>
       <p:cxnSp>
         <p:nvCxnSpPr>
-          <p:cNvPr id="249" name="直線接點 248">
-            <a:extLst>
-              <a:ext uri="{FF2B5EF4-FFF2-40B4-BE49-F238E27FC236}">
-                <a16:creationId xmlns:a16="http://schemas.microsoft.com/office/drawing/2014/main" id="{BDE79A8C-A386-4377-8BC6-8015B4D21232}"/>
-              </a:ext>
-            </a:extLst>
-          </p:cNvPr>
-          <p:cNvCxnSpPr>
-            <a:cxnSpLocks/>
-            <a:endCxn id="185" idx="0"/>
-          </p:cNvCxnSpPr>
-          <p:nvPr/>
-        </p:nvCxnSpPr>
-        <p:spPr>
-          <a:xfrm>
-            <a:off x="4093485" y="651922"/>
-            <a:ext cx="0" cy="439458"/>
-          </a:xfrm>
-          <a:prstGeom prst="line">
-            <a:avLst/>
-          </a:prstGeom>
-          <a:ln w="28575">
-            <a:solidFill>
-              <a:schemeClr val="tx1"/>
-            </a:solidFill>
-            <a:prstDash val="sysDot"/>
-          </a:ln>
-        </p:spPr>
-        <p:style>
-          <a:lnRef idx="1">
-            <a:schemeClr val="accent1"/>
-          </a:lnRef>
-          <a:fillRef idx="0">
-            <a:schemeClr val="accent1"/>
-          </a:fillRef>
-          <a:effectRef idx="0">
-            <a:schemeClr val="accent1"/>
-          </a:effectRef>
-          <a:fontRef idx="minor">
-            <a:schemeClr val="tx1"/>
-          </a:fontRef>
-        </p:style>
-      </p:cxnSp>
-      <p:cxnSp>
-        <p:nvCxnSpPr>
-          <p:cNvPr id="251" name="直線接點 250">
-            <a:extLst>
-              <a:ext uri="{FF2B5EF4-FFF2-40B4-BE49-F238E27FC236}">
-                <a16:creationId xmlns:a16="http://schemas.microsoft.com/office/drawing/2014/main" id="{1AE331D5-D3BA-4DA5-82DD-41E131EDB11F}"/>
-              </a:ext>
-            </a:extLst>
-          </p:cNvPr>
-          <p:cNvCxnSpPr>
-            <a:cxnSpLocks/>
-          </p:cNvCxnSpPr>
-          <p:nvPr/>
-        </p:nvCxnSpPr>
-        <p:spPr>
-          <a:xfrm>
-            <a:off x="4076434" y="651166"/>
-            <a:ext cx="2545705" cy="5248"/>
-          </a:xfrm>
-          <a:prstGeom prst="line">
-            <a:avLst/>
-          </a:prstGeom>
-          <a:ln w="28575">
-            <a:solidFill>
-              <a:schemeClr val="tx1"/>
-            </a:solidFill>
-            <a:prstDash val="sysDot"/>
-          </a:ln>
-        </p:spPr>
-        <p:style>
-          <a:lnRef idx="1">
-            <a:schemeClr val="accent1"/>
-          </a:lnRef>
-          <a:fillRef idx="0">
-            <a:schemeClr val="accent1"/>
-          </a:fillRef>
-          <a:effectRef idx="0">
-            <a:schemeClr val="accent1"/>
-          </a:effectRef>
-          <a:fontRef idx="minor">
-            <a:schemeClr val="tx1"/>
-          </a:fontRef>
-        </p:style>
-      </p:cxnSp>
-      <p:cxnSp>
-        <p:nvCxnSpPr>
-          <p:cNvPr id="254" name="直線接點 253">
-            <a:extLst>
-              <a:ext uri="{FF2B5EF4-FFF2-40B4-BE49-F238E27FC236}">
-                <a16:creationId xmlns:a16="http://schemas.microsoft.com/office/drawing/2014/main" id="{EF092D17-8292-4B01-B901-C68FF72B1E9F}"/>
-              </a:ext>
-            </a:extLst>
-          </p:cNvPr>
-          <p:cNvCxnSpPr>
-            <a:cxnSpLocks/>
-            <a:endCxn id="325" idx="0"/>
-          </p:cNvCxnSpPr>
-          <p:nvPr/>
-        </p:nvCxnSpPr>
-        <p:spPr>
-          <a:xfrm>
-            <a:off x="6622139" y="706153"/>
-            <a:ext cx="0" cy="2522006"/>
-          </a:xfrm>
-          <a:prstGeom prst="line">
-            <a:avLst/>
-          </a:prstGeom>
-          <a:ln w="28575">
-            <a:solidFill>
-              <a:schemeClr val="tx1"/>
-            </a:solidFill>
-            <a:prstDash val="sysDot"/>
-            <a:headEnd type="none" w="med" len="med"/>
-            <a:tailEnd type="arrow" w="med" len="med"/>
-          </a:ln>
-        </p:spPr>
-        <p:style>
-          <a:lnRef idx="1">
-            <a:schemeClr val="accent1"/>
-          </a:lnRef>
-          <a:fillRef idx="0">
-            <a:schemeClr val="accent1"/>
-          </a:fillRef>
-          <a:effectRef idx="0">
-            <a:schemeClr val="accent1"/>
-          </a:effectRef>
-          <a:fontRef idx="minor">
-            <a:schemeClr val="tx1"/>
-          </a:fontRef>
-        </p:style>
-      </p:cxnSp>
-      <p:cxnSp>
-        <p:nvCxnSpPr>
           <p:cNvPr id="259" name="直線單箭頭接點 258">
             <a:extLst>
               <a:ext uri="{FF2B5EF4-FFF2-40B4-BE49-F238E27FC236}">
@@ -10667,7 +10864,7 @@
         </p:nvCxnSpPr>
         <p:spPr>
           <a:xfrm flipV="1">
-            <a:off x="7914589" y="3523728"/>
+            <a:off x="8107002" y="3457031"/>
             <a:ext cx="180477" cy="3877"/>
           </a:xfrm>
           <a:prstGeom prst="straightConnector1">
@@ -10708,7 +10905,7 @@
         </p:nvCxnSpPr>
         <p:spPr>
           <a:xfrm flipV="1">
-            <a:off x="8480203" y="3523727"/>
+            <a:off x="8672616" y="3457030"/>
             <a:ext cx="189622" cy="1"/>
           </a:xfrm>
           <a:prstGeom prst="straightConnector1">
@@ -10750,7 +10947,7 @@
         </p:nvCxnSpPr>
         <p:spPr>
           <a:xfrm flipV="1">
-            <a:off x="8922950" y="3527529"/>
+            <a:off x="9115363" y="3460832"/>
             <a:ext cx="185476" cy="1618"/>
           </a:xfrm>
           <a:prstGeom prst="straightConnector1">
@@ -10789,7 +10986,7 @@
         </p:nvSpPr>
         <p:spPr>
           <a:xfrm>
-            <a:off x="7578346" y="4307287"/>
+            <a:off x="7770759" y="4240590"/>
             <a:ext cx="1173163" cy="324010"/>
           </a:xfrm>
           <a:prstGeom prst="rect">
@@ -10844,7 +11041,7 @@
         </p:nvSpPr>
         <p:spPr>
           <a:xfrm>
-            <a:off x="8570442" y="3173172"/>
+            <a:off x="8762855" y="3106475"/>
             <a:ext cx="629174" cy="523220"/>
           </a:xfrm>
           <a:prstGeom prst="rect">
@@ -10880,7 +11077,7 @@
         </p:nvSpPr>
         <p:spPr>
           <a:xfrm>
-            <a:off x="7517469" y="2037034"/>
+            <a:off x="7712074" y="978161"/>
             <a:ext cx="234000" cy="234000"/>
           </a:xfrm>
           <a:prstGeom prst="ellipse">
@@ -10926,7 +11123,7 @@
         </p:nvSpPr>
         <p:spPr>
           <a:xfrm>
-            <a:off x="7938101" y="2032092"/>
+            <a:off x="8132706" y="973219"/>
             <a:ext cx="234000" cy="234000"/>
           </a:xfrm>
           <a:prstGeom prst="ellipse">
@@ -10972,7 +11169,7 @@
         </p:nvSpPr>
         <p:spPr>
           <a:xfrm>
-            <a:off x="9108426" y="2044881"/>
+            <a:off x="9303031" y="986008"/>
             <a:ext cx="234000" cy="234000"/>
           </a:xfrm>
           <a:prstGeom prst="ellipse">
@@ -11018,7 +11215,7 @@
         </p:nvSpPr>
         <p:spPr>
           <a:xfrm>
-            <a:off x="7274652" y="2615500"/>
+            <a:off x="7467065" y="2548803"/>
             <a:ext cx="3042407" cy="448657"/>
           </a:xfrm>
           <a:prstGeom prst="roundRect">
@@ -11084,7 +11281,7 @@
         </p:nvSpPr>
         <p:spPr>
           <a:xfrm>
-            <a:off x="7451204" y="2736237"/>
+            <a:off x="7643617" y="2669540"/>
             <a:ext cx="1978546" cy="220454"/>
           </a:xfrm>
           <a:prstGeom prst="roundRect">
@@ -11145,7 +11342,7 @@
         </p:nvCxnSpPr>
         <p:spPr>
           <a:xfrm flipV="1">
-            <a:off x="7972124" y="2956691"/>
+            <a:off x="8164537" y="2889994"/>
             <a:ext cx="4033" cy="583494"/>
           </a:xfrm>
           <a:prstGeom prst="straightConnector1">
@@ -11187,8 +11384,8 @@
         </p:nvCxnSpPr>
         <p:spPr>
           <a:xfrm flipV="1">
-            <a:off x="7634469" y="2271034"/>
-            <a:ext cx="0" cy="465203"/>
+            <a:off x="7829074" y="1212161"/>
+            <a:ext cx="0" cy="1457379"/>
           </a:xfrm>
           <a:prstGeom prst="straightConnector1">
             <a:avLst/>
@@ -11233,9 +11430,9 @@
           <p:nvPr/>
         </p:nvCxnSpPr>
         <p:spPr>
-          <a:xfrm flipH="1" flipV="1">
-            <a:off x="8055101" y="2266092"/>
-            <a:ext cx="3767" cy="470145"/>
+          <a:xfrm flipV="1">
+            <a:off x="8249706" y="1207219"/>
+            <a:ext cx="0" cy="1459066"/>
           </a:xfrm>
           <a:prstGeom prst="straightConnector1">
             <a:avLst/>
@@ -11281,8 +11478,8 @@
         </p:nvCxnSpPr>
         <p:spPr>
           <a:xfrm flipV="1">
-            <a:off x="9225426" y="2278881"/>
-            <a:ext cx="0" cy="457356"/>
+            <a:off x="9420031" y="1220008"/>
+            <a:ext cx="0" cy="1449532"/>
           </a:xfrm>
           <a:prstGeom prst="straightConnector1">
             <a:avLst/>
@@ -11325,7 +11522,7 @@
         </p:nvSpPr>
         <p:spPr>
           <a:xfrm>
-            <a:off x="8409284" y="1789485"/>
+            <a:off x="8603889" y="730612"/>
             <a:ext cx="629174" cy="523220"/>
           </a:xfrm>
           <a:prstGeom prst="rect">
@@ -11364,7 +11561,7 @@
         </p:nvCxnSpPr>
         <p:spPr>
           <a:xfrm flipV="1">
-            <a:off x="7717448" y="3646776"/>
+            <a:off x="7909861" y="3580079"/>
             <a:ext cx="0" cy="676760"/>
           </a:xfrm>
           <a:prstGeom prst="straightConnector1">
@@ -11461,7 +11658,7 @@
         </p:nvSpPr>
         <p:spPr>
           <a:xfrm>
-            <a:off x="7913336" y="4682866"/>
+            <a:off x="8105749" y="4616169"/>
             <a:ext cx="495948" cy="871568"/>
           </a:xfrm>
           <a:prstGeom prst="upArrow">
@@ -11499,6 +11696,142 @@
           </a:p>
         </p:txBody>
       </p:sp>
+      <p:cxnSp>
+        <p:nvCxnSpPr>
+          <p:cNvPr id="249" name="直線接點 248">
+            <a:extLst>
+              <a:ext uri="{FF2B5EF4-FFF2-40B4-BE49-F238E27FC236}">
+                <a16:creationId xmlns:a16="http://schemas.microsoft.com/office/drawing/2014/main" id="{BDE79A8C-A386-4377-8BC6-8015B4D21232}"/>
+              </a:ext>
+            </a:extLst>
+          </p:cNvPr>
+          <p:cNvCxnSpPr>
+            <a:cxnSpLocks/>
+            <a:endCxn id="185" idx="0"/>
+          </p:cNvCxnSpPr>
+          <p:nvPr/>
+        </p:nvCxnSpPr>
+        <p:spPr>
+          <a:xfrm>
+            <a:off x="4093485" y="584951"/>
+            <a:ext cx="0" cy="506429"/>
+          </a:xfrm>
+          <a:prstGeom prst="line">
+            <a:avLst/>
+          </a:prstGeom>
+          <a:ln w="28575">
+            <a:solidFill>
+              <a:schemeClr val="tx1"/>
+            </a:solidFill>
+            <a:prstDash val="sysDot"/>
+          </a:ln>
+        </p:spPr>
+        <p:style>
+          <a:lnRef idx="1">
+            <a:schemeClr val="accent1"/>
+          </a:lnRef>
+          <a:fillRef idx="0">
+            <a:schemeClr val="accent1"/>
+          </a:fillRef>
+          <a:effectRef idx="0">
+            <a:schemeClr val="accent1"/>
+          </a:effectRef>
+          <a:fontRef idx="minor">
+            <a:schemeClr val="tx1"/>
+          </a:fontRef>
+        </p:style>
+      </p:cxnSp>
+      <p:cxnSp>
+        <p:nvCxnSpPr>
+          <p:cNvPr id="251" name="直線接點 250">
+            <a:extLst>
+              <a:ext uri="{FF2B5EF4-FFF2-40B4-BE49-F238E27FC236}">
+                <a16:creationId xmlns:a16="http://schemas.microsoft.com/office/drawing/2014/main" id="{1AE331D5-D3BA-4DA5-82DD-41E131EDB11F}"/>
+              </a:ext>
+            </a:extLst>
+          </p:cNvPr>
+          <p:cNvCxnSpPr>
+            <a:cxnSpLocks/>
+          </p:cNvCxnSpPr>
+          <p:nvPr/>
+        </p:nvCxnSpPr>
+        <p:spPr>
+          <a:xfrm>
+            <a:off x="4088697" y="590262"/>
+            <a:ext cx="2585881" cy="0"/>
+          </a:xfrm>
+          <a:prstGeom prst="line">
+            <a:avLst/>
+          </a:prstGeom>
+          <a:ln w="28575">
+            <a:solidFill>
+              <a:schemeClr val="tx1"/>
+            </a:solidFill>
+            <a:prstDash val="sysDot"/>
+          </a:ln>
+        </p:spPr>
+        <p:style>
+          <a:lnRef idx="1">
+            <a:schemeClr val="accent1"/>
+          </a:lnRef>
+          <a:fillRef idx="0">
+            <a:schemeClr val="accent1"/>
+          </a:fillRef>
+          <a:effectRef idx="0">
+            <a:schemeClr val="accent1"/>
+          </a:effectRef>
+          <a:fontRef idx="minor">
+            <a:schemeClr val="tx1"/>
+          </a:fontRef>
+        </p:style>
+      </p:cxnSp>
+      <p:cxnSp>
+        <p:nvCxnSpPr>
+          <p:cNvPr id="254" name="直線接點 253">
+            <a:extLst>
+              <a:ext uri="{FF2B5EF4-FFF2-40B4-BE49-F238E27FC236}">
+                <a16:creationId xmlns:a16="http://schemas.microsoft.com/office/drawing/2014/main" id="{EF092D17-8292-4B01-B901-C68FF72B1E9F}"/>
+              </a:ext>
+            </a:extLst>
+          </p:cNvPr>
+          <p:cNvCxnSpPr>
+            <a:cxnSpLocks/>
+            <a:endCxn id="325" idx="0"/>
+          </p:cNvCxnSpPr>
+          <p:nvPr/>
+        </p:nvCxnSpPr>
+        <p:spPr>
+          <a:xfrm flipH="1">
+            <a:off x="6674578" y="568703"/>
+            <a:ext cx="2932" cy="2696332"/>
+          </a:xfrm>
+          <a:prstGeom prst="line">
+            <a:avLst/>
+          </a:prstGeom>
+          <a:ln w="28575">
+            <a:solidFill>
+              <a:schemeClr val="tx1"/>
+            </a:solidFill>
+            <a:prstDash val="sysDot"/>
+            <a:headEnd type="none" w="med" len="med"/>
+            <a:tailEnd type="arrow" w="med" len="med"/>
+          </a:ln>
+        </p:spPr>
+        <p:style>
+          <a:lnRef idx="1">
+            <a:schemeClr val="accent1"/>
+          </a:lnRef>
+          <a:fillRef idx="0">
+            <a:schemeClr val="accent1"/>
+          </a:fillRef>
+          <a:effectRef idx="0">
+            <a:schemeClr val="accent1"/>
+          </a:effectRef>
+          <a:fontRef idx="minor">
+            <a:schemeClr val="tx1"/>
+          </a:fontRef>
+        </p:style>
+      </p:cxnSp>
       <p:sp>
         <p:nvSpPr>
           <p:cNvPr id="325" name="流程圖: 接點 324">
@@ -11513,8 +11846,8 @@
         </p:nvSpPr>
         <p:spPr>
           <a:xfrm>
-            <a:off x="6126589" y="3228159"/>
-            <a:ext cx="991099" cy="591136"/>
+            <a:off x="5861617" y="3265035"/>
+            <a:ext cx="1625922" cy="401702"/>
           </a:xfrm>
           <a:prstGeom prst="flowChartConnector">
             <a:avLst/>
@@ -11546,12 +11879,12 @@
           <a:p>
             <a:pPr algn="ctr"/>
             <a:r>
-              <a:rPr lang="en-US" altLang="zh-TW" sz="1400" dirty="0" err="1">
+              <a:rPr lang="en-US" altLang="zh-TW" sz="1400" dirty="0">
                 <a:solidFill>
                   <a:schemeClr val="tx1"/>
                 </a:solidFill>
               </a:rPr>
-              <a:t>Concat</a:t>
+              <a:t>Concatenate</a:t>
             </a:r>
             <a:endParaRPr lang="zh-TW" altLang="en-US" sz="1400" dirty="0">
               <a:solidFill>
@@ -11580,7 +11913,7 @@
         <p:spPr>
           <a:xfrm>
             <a:off x="5632923" y="3242579"/>
-            <a:ext cx="493666" cy="281148"/>
+            <a:ext cx="228694" cy="223307"/>
           </a:xfrm>
           <a:prstGeom prst="curvedConnector3">
             <a:avLst>
@@ -11622,15 +11955,16 @@
             </a:extLst>
           </p:cNvPr>
           <p:cNvCxnSpPr>
+            <a:cxnSpLocks/>
             <a:stCxn id="325" idx="6"/>
             <a:endCxn id="241" idx="1"/>
           </p:cNvCxnSpPr>
           <p:nvPr/>
         </p:nvCxnSpPr>
         <p:spPr>
-          <a:xfrm>
-            <a:off x="7117688" y="3523727"/>
-            <a:ext cx="402619" cy="3878"/>
+          <a:xfrm flipV="1">
+            <a:off x="7487539" y="3460908"/>
+            <a:ext cx="225181" cy="4978"/>
           </a:xfrm>
           <a:prstGeom prst="straightConnector1">
             <a:avLst/>
@@ -11668,8 +12002,8 @@
         </p:nvSpPr>
         <p:spPr>
           <a:xfrm>
-            <a:off x="8207165" y="737285"/>
-            <a:ext cx="715785" cy="1294807"/>
+            <a:off x="8457449" y="167485"/>
+            <a:ext cx="715785" cy="823290"/>
           </a:xfrm>
           <a:prstGeom prst="upArrow">
             <a:avLst/>

</xml_diff>